<commit_message>
Adicionado imagens do Slide
</commit_message>
<xml_diff>
--- a/Documentação/Guia do Bootloader das Galáxias.pptx
+++ b/Documentação/Guia do Bootloader das Galáxias.pptx
@@ -19,18 +19,20 @@
     <p:sldId id="264" r:id="rId14"/>
     <p:sldId id="265" r:id="rId15"/>
     <p:sldId id="266" r:id="rId16"/>
+    <p:sldId id="267" r:id="rId17"/>
+    <p:sldId id="268" r:id="rId18"/>
   </p:sldIdLst>
   <p:sldSz cy="5143500" cx="9144000"/>
   <p:notesSz cx="6858000" cy="9144000"/>
   <p:embeddedFontLst>
     <p:embeddedFont>
       <p:font typeface="Average"/>
-      <p:regular r:id="rId17"/>
+      <p:regular r:id="rId19"/>
     </p:embeddedFont>
     <p:embeddedFont>
       <p:font typeface="Oswald"/>
-      <p:regular r:id="rId18"/>
-      <p:bold r:id="rId19"/>
+      <p:regular r:id="rId20"/>
+      <p:bold r:id="rId21"/>
     </p:embeddedFont>
   </p:embeddedFontLst>
   <p:defaultTextStyle>
@@ -924,7 +926,7 @@
       </p:grpSpPr>
       <p:sp>
         <p:nvSpPr>
-          <p:cNvPr id="121" name="Google Shape;121;g5b9a39513a_2_37:notes"/>
+          <p:cNvPr id="121" name="Google Shape;121;g5c7fd850a5_1_6:notes"/>
           <p:cNvSpPr/>
           <p:nvPr>
             <p:ph idx="2" type="sldImg"/>
@@ -959,7 +961,205 @@
       </p:sp>
       <p:sp>
         <p:nvSpPr>
-          <p:cNvPr id="122" name="Google Shape;122;g5b9a39513a_2_37:notes"/>
+          <p:cNvPr id="122" name="Google Shape;122;g5c7fd850a5_1_6:notes"/>
+          <p:cNvSpPr txBox="1"/>
+          <p:nvPr>
+            <p:ph idx="1" type="body"/>
+          </p:nvPr>
+        </p:nvSpPr>
+        <p:spPr>
+          <a:xfrm>
+            <a:off x="685800" y="4343400"/>
+            <a:ext cx="5486400" cy="4114800"/>
+          </a:xfrm>
+          <a:prstGeom prst="rect">
+            <a:avLst/>
+          </a:prstGeom>
+        </p:spPr>
+        <p:txBody>
+          <a:bodyPr anchorCtr="0" anchor="t" bIns="91425" lIns="91425" spcFirstLastPara="1" rIns="91425" wrap="square" tIns="91425">
+            <a:noAutofit/>
+          </a:bodyPr>
+          <a:lstStyle/>
+          <a:p>
+            <a:pPr indent="0" lvl="0" marL="0" rtl="0" algn="l">
+              <a:spcBef>
+                <a:spcPts val="0"/>
+              </a:spcBef>
+              <a:spcAft>
+                <a:spcPts val="0"/>
+              </a:spcAft>
+              <a:buNone/>
+            </a:pPr>
+            <a:r>
+              <a:t/>
+            </a:r>
+            <a:endParaRPr/>
+          </a:p>
+        </p:txBody>
+      </p:sp>
+    </p:spTree>
+  </p:cSld>
+  <p:clrMapOvr>
+    <a:masterClrMapping/>
+  </p:clrMapOvr>
+</p:notes>
+</file>
+
+<file path=ppt/notesSlides/notesSlide12.xml><?xml version="1.0" encoding="utf-8"?>
+<p:notes xmlns:a="http://schemas.openxmlformats.org/drawingml/2006/main" xmlns:r="http://schemas.openxmlformats.org/officeDocument/2006/relationships" xmlns:mc="http://schemas.openxmlformats.org/markup-compatibility/2006" xmlns:mv="urn:schemas-microsoft-com:mac:vml" xmlns:p="http://schemas.openxmlformats.org/presentationml/2006/main" xmlns:c="http://schemas.openxmlformats.org/drawingml/2006/chart" xmlns:dgm="http://schemas.openxmlformats.org/drawingml/2006/diagram" xmlns:o="urn:schemas-microsoft-com:office:office" xmlns:v="urn:schemas-microsoft-com:vml" xmlns:pvml="urn:schemas-microsoft-com:office:powerpoint" xmlns:com="http://schemas.openxmlformats.org/drawingml/2006/compatibility" xmlns:p14="http://schemas.microsoft.com/office/powerpoint/2010/main" xmlns:p15="http://schemas.microsoft.com/office/powerpoint/2012/main" showMasterPhAnim="0" showMasterSp="0">
+  <p:cSld>
+    <p:spTree>
+      <p:nvGrpSpPr>
+        <p:cNvPr id="127" name="Shape 127"/>
+        <p:cNvGrpSpPr/>
+        <p:nvPr/>
+      </p:nvGrpSpPr>
+      <p:grpSpPr>
+        <a:xfrm>
+          <a:off x="0" y="0"/>
+          <a:ext cx="0" cy="0"/>
+          <a:chOff x="0" y="0"/>
+          <a:chExt cx="0" cy="0"/>
+        </a:xfrm>
+      </p:grpSpPr>
+      <p:sp>
+        <p:nvSpPr>
+          <p:cNvPr id="128" name="Google Shape;128;g5c7fd850a5_1_0:notes"/>
+          <p:cNvSpPr/>
+          <p:nvPr>
+            <p:ph idx="2" type="sldImg"/>
+          </p:nvPr>
+        </p:nvSpPr>
+        <p:spPr>
+          <a:xfrm>
+            <a:off x="381300" y="685800"/>
+            <a:ext cx="6096000" cy="3429000"/>
+          </a:xfrm>
+          <a:custGeom>
+            <a:rect b="b" l="l" r="r" t="t"/>
+            <a:pathLst>
+              <a:path extrusionOk="0" h="120000" w="120000">
+                <a:moveTo>
+                  <a:pt x="0" y="0"/>
+                </a:moveTo>
+                <a:lnTo>
+                  <a:pt x="120000" y="0"/>
+                </a:lnTo>
+                <a:lnTo>
+                  <a:pt x="120000" y="120000"/>
+                </a:lnTo>
+                <a:lnTo>
+                  <a:pt x="0" y="120000"/>
+                </a:lnTo>
+                <a:close/>
+              </a:path>
+            </a:pathLst>
+          </a:custGeom>
+        </p:spPr>
+      </p:sp>
+      <p:sp>
+        <p:nvSpPr>
+          <p:cNvPr id="129" name="Google Shape;129;g5c7fd850a5_1_0:notes"/>
+          <p:cNvSpPr txBox="1"/>
+          <p:nvPr>
+            <p:ph idx="1" type="body"/>
+          </p:nvPr>
+        </p:nvSpPr>
+        <p:spPr>
+          <a:xfrm>
+            <a:off x="685800" y="4343400"/>
+            <a:ext cx="5486400" cy="4114800"/>
+          </a:xfrm>
+          <a:prstGeom prst="rect">
+            <a:avLst/>
+          </a:prstGeom>
+        </p:spPr>
+        <p:txBody>
+          <a:bodyPr anchorCtr="0" anchor="t" bIns="91425" lIns="91425" spcFirstLastPara="1" rIns="91425" wrap="square" tIns="91425">
+            <a:noAutofit/>
+          </a:bodyPr>
+          <a:lstStyle/>
+          <a:p>
+            <a:pPr indent="0" lvl="0" marL="0" rtl="0" algn="l">
+              <a:spcBef>
+                <a:spcPts val="0"/>
+              </a:spcBef>
+              <a:spcAft>
+                <a:spcPts val="0"/>
+              </a:spcAft>
+              <a:buNone/>
+            </a:pPr>
+            <a:r>
+              <a:t/>
+            </a:r>
+            <a:endParaRPr/>
+          </a:p>
+        </p:txBody>
+      </p:sp>
+    </p:spTree>
+  </p:cSld>
+  <p:clrMapOvr>
+    <a:masterClrMapping/>
+  </p:clrMapOvr>
+</p:notes>
+</file>
+
+<file path=ppt/notesSlides/notesSlide13.xml><?xml version="1.0" encoding="utf-8"?>
+<p:notes xmlns:a="http://schemas.openxmlformats.org/drawingml/2006/main" xmlns:r="http://schemas.openxmlformats.org/officeDocument/2006/relationships" xmlns:mc="http://schemas.openxmlformats.org/markup-compatibility/2006" xmlns:mv="urn:schemas-microsoft-com:mac:vml" xmlns:p="http://schemas.openxmlformats.org/presentationml/2006/main" xmlns:c="http://schemas.openxmlformats.org/drawingml/2006/chart" xmlns:dgm="http://schemas.openxmlformats.org/drawingml/2006/diagram" xmlns:o="urn:schemas-microsoft-com:office:office" xmlns:v="urn:schemas-microsoft-com:vml" xmlns:pvml="urn:schemas-microsoft-com:office:powerpoint" xmlns:com="http://schemas.openxmlformats.org/drawingml/2006/compatibility" xmlns:p14="http://schemas.microsoft.com/office/powerpoint/2010/main" xmlns:p15="http://schemas.microsoft.com/office/powerpoint/2012/main" showMasterPhAnim="0" showMasterSp="0">
+  <p:cSld>
+    <p:spTree>
+      <p:nvGrpSpPr>
+        <p:cNvPr id="134" name="Shape 134"/>
+        <p:cNvGrpSpPr/>
+        <p:nvPr/>
+      </p:nvGrpSpPr>
+      <p:grpSpPr>
+        <a:xfrm>
+          <a:off x="0" y="0"/>
+          <a:ext cx="0" cy="0"/>
+          <a:chOff x="0" y="0"/>
+          <a:chExt cx="0" cy="0"/>
+        </a:xfrm>
+      </p:grpSpPr>
+      <p:sp>
+        <p:nvSpPr>
+          <p:cNvPr id="135" name="Google Shape;135;g5b9a39513a_2_37:notes"/>
+          <p:cNvSpPr/>
+          <p:nvPr>
+            <p:ph idx="2" type="sldImg"/>
+          </p:nvPr>
+        </p:nvSpPr>
+        <p:spPr>
+          <a:xfrm>
+            <a:off x="381300" y="685800"/>
+            <a:ext cx="6096000" cy="3429000"/>
+          </a:xfrm>
+          <a:custGeom>
+            <a:rect b="b" l="l" r="r" t="t"/>
+            <a:pathLst>
+              <a:path extrusionOk="0" h="120000" w="120000">
+                <a:moveTo>
+                  <a:pt x="0" y="0"/>
+                </a:moveTo>
+                <a:lnTo>
+                  <a:pt x="120000" y="0"/>
+                </a:lnTo>
+                <a:lnTo>
+                  <a:pt x="120000" y="120000"/>
+                </a:lnTo>
+                <a:lnTo>
+                  <a:pt x="0" y="120000"/>
+                </a:lnTo>
+                <a:close/>
+              </a:path>
+            </a:pathLst>
+          </a:custGeom>
+        </p:spPr>
+      </p:sp>
+      <p:sp>
+        <p:nvSpPr>
+          <p:cNvPr id="136" name="Google Shape;136;g5b9a39513a_2_37:notes"/>
           <p:cNvSpPr txBox="1"/>
           <p:nvPr>
             <p:ph idx="1" type="body"/>
@@ -7255,8 +7455,8 @@
         </p:blipFill>
         <p:spPr>
           <a:xfrm>
-            <a:off x="1272650" y="87812"/>
-            <a:ext cx="6598700" cy="4967875"/>
+            <a:off x="1328725" y="130038"/>
+            <a:ext cx="6486550" cy="4883425"/>
           </a:xfrm>
           <a:prstGeom prst="rect">
             <a:avLst/>
@@ -7325,8 +7525,7 @@
               <a:buNone/>
             </a:pPr>
             <a:r>
-              <a:rPr lang="pt-BR"/>
-              <a:t>ORIGADO PELA ATENÇÃO!</a:t>
+              <a:t/>
             </a:r>
             <a:endParaRPr/>
           </a:p>
@@ -7374,6 +7573,268 @@
       <p:pic>
         <p:nvPicPr>
           <p:cNvPr id="126" name="Google Shape;126;p23"/>
+          <p:cNvPicPr preferRelativeResize="0"/>
+          <p:nvPr/>
+        </p:nvPicPr>
+        <p:blipFill rotWithShape="1">
+          <a:blip r:embed="rId3">
+            <a:alphaModFix/>
+          </a:blip>
+          <a:srcRect b="47976" l="0" r="0" t="0"/>
+          <a:stretch/>
+        </p:blipFill>
+        <p:spPr>
+          <a:xfrm>
+            <a:off x="1283650" y="1233800"/>
+            <a:ext cx="6576699" cy="2675900"/>
+          </a:xfrm>
+          <a:prstGeom prst="rect">
+            <a:avLst/>
+          </a:prstGeom>
+          <a:noFill/>
+          <a:ln>
+            <a:noFill/>
+          </a:ln>
+        </p:spPr>
+      </p:pic>
+    </p:spTree>
+  </p:cSld>
+  <p:clrMapOvr>
+    <a:masterClrMapping/>
+  </p:clrMapOvr>
+</p:sld>
+</file>
+
+<file path=ppt/slides/slide12.xml><?xml version="1.0" encoding="utf-8"?>
+<p:sld xmlns:a="http://schemas.openxmlformats.org/drawingml/2006/main" xmlns:r="http://schemas.openxmlformats.org/officeDocument/2006/relationships" xmlns:mc="http://schemas.openxmlformats.org/markup-compatibility/2006" xmlns:mv="urn:schemas-microsoft-com:mac:vml" xmlns:p="http://schemas.openxmlformats.org/presentationml/2006/main" xmlns:c="http://schemas.openxmlformats.org/drawingml/2006/chart" xmlns:dgm="http://schemas.openxmlformats.org/drawingml/2006/diagram" xmlns:o="urn:schemas-microsoft-com:office:office" xmlns:v="urn:schemas-microsoft-com:vml" xmlns:pvml="urn:schemas-microsoft-com:office:powerpoint" xmlns:com="http://schemas.openxmlformats.org/drawingml/2006/compatibility" xmlns:p14="http://schemas.microsoft.com/office/powerpoint/2010/main" xmlns:p15="http://schemas.microsoft.com/office/powerpoint/2012/main">
+  <p:cSld>
+    <p:spTree>
+      <p:nvGrpSpPr>
+        <p:cNvPr id="130" name="Shape 130"/>
+        <p:cNvGrpSpPr/>
+        <p:nvPr/>
+      </p:nvGrpSpPr>
+      <p:grpSpPr>
+        <a:xfrm>
+          <a:off x="0" y="0"/>
+          <a:ext cx="0" cy="0"/>
+          <a:chOff x="0" y="0"/>
+          <a:chExt cx="0" cy="0"/>
+        </a:xfrm>
+      </p:grpSpPr>
+      <p:sp>
+        <p:nvSpPr>
+          <p:cNvPr id="131" name="Google Shape;131;p24"/>
+          <p:cNvSpPr txBox="1"/>
+          <p:nvPr>
+            <p:ph type="title"/>
+          </p:nvPr>
+        </p:nvSpPr>
+        <p:spPr>
+          <a:xfrm>
+            <a:off x="311700" y="445025"/>
+            <a:ext cx="8520600" cy="572700"/>
+          </a:xfrm>
+          <a:prstGeom prst="rect">
+            <a:avLst/>
+          </a:prstGeom>
+        </p:spPr>
+        <p:txBody>
+          <a:bodyPr anchorCtr="0" anchor="t" bIns="91425" lIns="91425" spcFirstLastPara="1" rIns="91425" wrap="square" tIns="91425">
+            <a:noAutofit/>
+          </a:bodyPr>
+          <a:lstStyle/>
+          <a:p>
+            <a:pPr indent="0" lvl="0" marL="0" rtl="0" algn="l">
+              <a:spcBef>
+                <a:spcPts val="0"/>
+              </a:spcBef>
+              <a:spcAft>
+                <a:spcPts val="0"/>
+              </a:spcAft>
+              <a:buNone/>
+            </a:pPr>
+            <a:r>
+              <a:t/>
+            </a:r>
+            <a:endParaRPr/>
+          </a:p>
+        </p:txBody>
+      </p:sp>
+      <p:sp>
+        <p:nvSpPr>
+          <p:cNvPr id="132" name="Google Shape;132;p24"/>
+          <p:cNvSpPr txBox="1"/>
+          <p:nvPr>
+            <p:ph idx="1" type="body"/>
+          </p:nvPr>
+        </p:nvSpPr>
+        <p:spPr>
+          <a:xfrm>
+            <a:off x="311700" y="1152475"/>
+            <a:ext cx="8520600" cy="3416400"/>
+          </a:xfrm>
+          <a:prstGeom prst="rect">
+            <a:avLst/>
+          </a:prstGeom>
+        </p:spPr>
+        <p:txBody>
+          <a:bodyPr anchorCtr="0" anchor="t" bIns="91425" lIns="91425" spcFirstLastPara="1" rIns="91425" wrap="square" tIns="91425">
+            <a:noAutofit/>
+          </a:bodyPr>
+          <a:lstStyle/>
+          <a:p>
+            <a:pPr indent="0" lvl="0" marL="0" rtl="0" algn="l">
+              <a:spcBef>
+                <a:spcPts val="0"/>
+              </a:spcBef>
+              <a:spcAft>
+                <a:spcPts val="1600"/>
+              </a:spcAft>
+              <a:buNone/>
+            </a:pPr>
+            <a:r>
+              <a:t/>
+            </a:r>
+            <a:endParaRPr/>
+          </a:p>
+        </p:txBody>
+      </p:sp>
+      <p:pic>
+        <p:nvPicPr>
+          <p:cNvPr id="133" name="Google Shape;133;p24"/>
+          <p:cNvPicPr preferRelativeResize="0"/>
+          <p:nvPr/>
+        </p:nvPicPr>
+        <p:blipFill>
+          <a:blip r:embed="rId3">
+            <a:alphaModFix/>
+          </a:blip>
+          <a:stretch>
+            <a:fillRect/>
+          </a:stretch>
+        </p:blipFill>
+        <p:spPr>
+          <a:xfrm>
+            <a:off x="1143000" y="371475"/>
+            <a:ext cx="6858000" cy="4400550"/>
+          </a:xfrm>
+          <a:prstGeom prst="rect">
+            <a:avLst/>
+          </a:prstGeom>
+          <a:noFill/>
+          <a:ln>
+            <a:noFill/>
+          </a:ln>
+        </p:spPr>
+      </p:pic>
+    </p:spTree>
+  </p:cSld>
+  <p:clrMapOvr>
+    <a:masterClrMapping/>
+  </p:clrMapOvr>
+</p:sld>
+</file>
+
+<file path=ppt/slides/slide13.xml><?xml version="1.0" encoding="utf-8"?>
+<p:sld xmlns:a="http://schemas.openxmlformats.org/drawingml/2006/main" xmlns:r="http://schemas.openxmlformats.org/officeDocument/2006/relationships" xmlns:mc="http://schemas.openxmlformats.org/markup-compatibility/2006" xmlns:mv="urn:schemas-microsoft-com:mac:vml" xmlns:p="http://schemas.openxmlformats.org/presentationml/2006/main" xmlns:c="http://schemas.openxmlformats.org/drawingml/2006/chart" xmlns:dgm="http://schemas.openxmlformats.org/drawingml/2006/diagram" xmlns:o="urn:schemas-microsoft-com:office:office" xmlns:v="urn:schemas-microsoft-com:vml" xmlns:pvml="urn:schemas-microsoft-com:office:powerpoint" xmlns:com="http://schemas.openxmlformats.org/drawingml/2006/compatibility" xmlns:p14="http://schemas.microsoft.com/office/powerpoint/2010/main" xmlns:p15="http://schemas.microsoft.com/office/powerpoint/2012/main">
+  <p:cSld>
+    <p:spTree>
+      <p:nvGrpSpPr>
+        <p:cNvPr id="137" name="Shape 137"/>
+        <p:cNvGrpSpPr/>
+        <p:nvPr/>
+      </p:nvGrpSpPr>
+      <p:grpSpPr>
+        <a:xfrm>
+          <a:off x="0" y="0"/>
+          <a:ext cx="0" cy="0"/>
+          <a:chOff x="0" y="0"/>
+          <a:chExt cx="0" cy="0"/>
+        </a:xfrm>
+      </p:grpSpPr>
+      <p:sp>
+        <p:nvSpPr>
+          <p:cNvPr id="138" name="Google Shape;138;p25"/>
+          <p:cNvSpPr txBox="1"/>
+          <p:nvPr>
+            <p:ph type="title"/>
+          </p:nvPr>
+        </p:nvSpPr>
+        <p:spPr>
+          <a:xfrm>
+            <a:off x="311700" y="445025"/>
+            <a:ext cx="8520600" cy="572700"/>
+          </a:xfrm>
+          <a:prstGeom prst="rect">
+            <a:avLst/>
+          </a:prstGeom>
+        </p:spPr>
+        <p:txBody>
+          <a:bodyPr anchorCtr="0" anchor="t" bIns="91425" lIns="91425" spcFirstLastPara="1" rIns="91425" wrap="square" tIns="91425">
+            <a:noAutofit/>
+          </a:bodyPr>
+          <a:lstStyle/>
+          <a:p>
+            <a:pPr indent="0" lvl="0" marL="0" rtl="0" algn="l">
+              <a:spcBef>
+                <a:spcPts val="0"/>
+              </a:spcBef>
+              <a:spcAft>
+                <a:spcPts val="0"/>
+              </a:spcAft>
+              <a:buNone/>
+            </a:pPr>
+            <a:r>
+              <a:rPr lang="pt-BR"/>
+              <a:t>ORIGADO PELA ATENÇÃO!</a:t>
+            </a:r>
+            <a:endParaRPr/>
+          </a:p>
+        </p:txBody>
+      </p:sp>
+      <p:sp>
+        <p:nvSpPr>
+          <p:cNvPr id="139" name="Google Shape;139;p25"/>
+          <p:cNvSpPr txBox="1"/>
+          <p:nvPr>
+            <p:ph idx="1" type="body"/>
+          </p:nvPr>
+        </p:nvSpPr>
+        <p:spPr>
+          <a:xfrm>
+            <a:off x="311700" y="1152475"/>
+            <a:ext cx="8520600" cy="3416400"/>
+          </a:xfrm>
+          <a:prstGeom prst="rect">
+            <a:avLst/>
+          </a:prstGeom>
+        </p:spPr>
+        <p:txBody>
+          <a:bodyPr anchorCtr="0" anchor="t" bIns="91425" lIns="91425" spcFirstLastPara="1" rIns="91425" wrap="square" tIns="91425">
+            <a:noAutofit/>
+          </a:bodyPr>
+          <a:lstStyle/>
+          <a:p>
+            <a:pPr indent="0" lvl="0" marL="0" rtl="0" algn="l">
+              <a:spcBef>
+                <a:spcPts val="0"/>
+              </a:spcBef>
+              <a:spcAft>
+                <a:spcPts val="1600"/>
+              </a:spcAft>
+              <a:buNone/>
+            </a:pPr>
+            <a:r>
+              <a:t/>
+            </a:r>
+            <a:endParaRPr/>
+          </a:p>
+        </p:txBody>
+      </p:sp>
+      <p:pic>
+        <p:nvPicPr>
+          <p:cNvPr id="140" name="Google Shape;140;p25"/>
           <p:cNvPicPr preferRelativeResize="0"/>
           <p:nvPr/>
         </p:nvPicPr>
@@ -7519,7 +7980,7 @@
         </p:blipFill>
         <p:spPr>
           <a:xfrm>
-            <a:off x="219363" y="1152474"/>
+            <a:off x="219350" y="1224174"/>
             <a:ext cx="8705277" cy="3273000"/>
           </a:xfrm>
           <a:prstGeom prst="rect">
@@ -7634,89 +8095,89 @@
           </a:bodyPr>
           <a:lstStyle/>
           <a:p>
-            <a:pPr indent="-342900" lvl="0" marL="457200" rtl="0" algn="l">
-              <a:spcBef>
-                <a:spcPts val="0"/>
-              </a:spcBef>
-              <a:spcAft>
-                <a:spcPts val="0"/>
-              </a:spcAft>
-              <a:buSzPts val="1800"/>
+            <a:pPr indent="-381000" lvl="0" marL="457200" rtl="0" algn="l">
+              <a:spcBef>
+                <a:spcPts val="0"/>
+              </a:spcBef>
+              <a:spcAft>
+                <a:spcPts val="0"/>
+              </a:spcAft>
+              <a:buSzPts val="2400"/>
               <a:buChar char="●"/>
             </a:pPr>
             <a:r>
-              <a:rPr lang="pt-BR"/>
+              <a:rPr lang="pt-BR" sz="2400"/>
               <a:t>Registradores Resetados;</a:t>
             </a:r>
-            <a:endParaRPr/>
+            <a:endParaRPr sz="2400"/>
           </a:p>
           <a:p>
-            <a:pPr indent="-342900" lvl="0" marL="457200" rtl="0" algn="l">
-              <a:spcBef>
-                <a:spcPts val="0"/>
-              </a:spcBef>
-              <a:spcAft>
-                <a:spcPts val="0"/>
-              </a:spcAft>
-              <a:buSzPts val="1800"/>
+            <a:pPr indent="-381000" lvl="0" marL="457200" rtl="0" algn="l">
+              <a:spcBef>
+                <a:spcPts val="0"/>
+              </a:spcBef>
+              <a:spcAft>
+                <a:spcPts val="0"/>
+              </a:spcAft>
+              <a:buSzPts val="2400"/>
               <a:buChar char="●"/>
             </a:pPr>
             <a:r>
-              <a:rPr lang="pt-BR"/>
+              <a:rPr lang="pt-BR" sz="2400"/>
               <a:t>Localizada na ROM;</a:t>
             </a:r>
-            <a:endParaRPr/>
+            <a:endParaRPr sz="2400"/>
           </a:p>
           <a:p>
-            <a:pPr indent="-342900" lvl="0" marL="457200" rtl="0" algn="l">
-              <a:spcBef>
-                <a:spcPts val="0"/>
-              </a:spcBef>
-              <a:spcAft>
-                <a:spcPts val="0"/>
-              </a:spcAft>
-              <a:buSzPts val="1800"/>
+            <a:pPr indent="-381000" lvl="0" marL="457200" rtl="0" algn="l">
+              <a:spcBef>
+                <a:spcPts val="0"/>
+              </a:spcBef>
+              <a:spcAft>
+                <a:spcPts val="0"/>
+              </a:spcAft>
+              <a:buSzPts val="2400"/>
               <a:buChar char="●"/>
             </a:pPr>
             <a:r>
-              <a:rPr lang="pt-BR"/>
+              <a:rPr lang="pt-BR" sz="2400"/>
               <a:t>Power-On Self Test;</a:t>
             </a:r>
-            <a:endParaRPr/>
+            <a:endParaRPr sz="2400"/>
           </a:p>
           <a:p>
-            <a:pPr indent="-342900" lvl="0" marL="457200" rtl="0" algn="l">
-              <a:spcBef>
-                <a:spcPts val="0"/>
-              </a:spcBef>
-              <a:spcAft>
-                <a:spcPts val="0"/>
-              </a:spcAft>
-              <a:buSzPts val="1800"/>
+            <a:pPr indent="-381000" lvl="0" marL="457200" rtl="0" algn="l">
+              <a:spcBef>
+                <a:spcPts val="0"/>
+              </a:spcBef>
+              <a:spcAft>
+                <a:spcPts val="0"/>
+              </a:spcAft>
+              <a:buSzPts val="2400"/>
               <a:buChar char="●"/>
             </a:pPr>
             <a:r>
-              <a:rPr lang="pt-BR"/>
+              <a:rPr lang="pt-BR" sz="2400"/>
               <a:t>Procura pelo dispositivo de Boot e o carrega na memória;</a:t>
             </a:r>
-            <a:endParaRPr/>
+            <a:endParaRPr sz="2400"/>
           </a:p>
           <a:p>
-            <a:pPr indent="-342900" lvl="0" marL="457200" rtl="0" algn="l">
-              <a:spcBef>
-                <a:spcPts val="0"/>
-              </a:spcBef>
-              <a:spcAft>
-                <a:spcPts val="0"/>
-              </a:spcAft>
-              <a:buSzPts val="1800"/>
+            <a:pPr indent="-381000" lvl="0" marL="457200" rtl="0" algn="l">
+              <a:spcBef>
+                <a:spcPts val="0"/>
+              </a:spcBef>
+              <a:spcAft>
+                <a:spcPts val="0"/>
+              </a:spcAft>
+              <a:buSzPts val="2400"/>
               <a:buChar char="●"/>
             </a:pPr>
             <a:r>
-              <a:rPr lang="pt-BR"/>
+              <a:rPr lang="pt-BR" sz="2400"/>
               <a:t>Passa o controle para o Master Boot Record;</a:t>
             </a:r>
-            <a:endParaRPr/>
+            <a:endParaRPr sz="2400"/>
           </a:p>
         </p:txBody>
       </p:sp>
@@ -7820,7 +8281,7 @@
             </a:pPr>
             <a:r>
               <a:rPr lang="pt-BR" sz="2400"/>
-              <a:t>Boot Signature (Magic Number)</a:t>
+              <a:t>Boot Signature (Magic Number);</a:t>
             </a:r>
             <a:endParaRPr sz="2400"/>
           </a:p>
@@ -7837,7 +8298,7 @@
             </a:pPr>
             <a:r>
               <a:rPr lang="pt-BR" sz="2400"/>
-              <a:t>Encontrado no bootsector do disco</a:t>
+              <a:t>Encontrado no bootsector do disco;</a:t>
             </a:r>
             <a:endParaRPr sz="2400"/>
           </a:p>
@@ -7854,7 +8315,7 @@
             </a:pPr>
             <a:r>
               <a:rPr lang="pt-BR" sz="2400"/>
-              <a:t>Procura uma partição ativa na Tabela de Partições (Partition Table)</a:t>
+              <a:t>Procura uma partição ativa na Tabela de Partições (Partition Table);</a:t>
             </a:r>
             <a:endParaRPr sz="2400"/>
           </a:p>
@@ -7871,7 +8332,7 @@
             </a:pPr>
             <a:r>
               <a:rPr lang="pt-BR" sz="2400"/>
-              <a:t>Carrega o bootsector da partição ativa (Volume Boot Record) para a memória</a:t>
+              <a:t>Carrega o bootsector da partição ativa (Volume Boot Record) para a memória;</a:t>
             </a:r>
             <a:endParaRPr sz="2400"/>
           </a:p>
@@ -7888,7 +8349,7 @@
             </a:pPr>
             <a:r>
               <a:rPr lang="pt-BR" sz="2400"/>
-              <a:t>Também chamado de Primeiro Estágio do Bootloader</a:t>
+              <a:t>Também chamado de Primeiro Estágio do Bootloader;</a:t>
             </a:r>
             <a:endParaRPr sz="2400"/>
           </a:p>
@@ -8307,7 +8768,7 @@
             </a:pPr>
             <a:r>
               <a:rPr lang="pt-BR" sz="2400"/>
-              <a:t>Irá carregar o kernel na memória</a:t>
+              <a:t>Irá carregar o kernel na memória;</a:t>
             </a:r>
             <a:endParaRPr sz="2400"/>
           </a:p>
@@ -8324,7 +8785,7 @@
             </a:pPr>
             <a:r>
               <a:rPr lang="pt-BR" sz="2400"/>
-              <a:t>Troca para o Modo Protegido</a:t>
+              <a:t>Troca para o Modo Protegido;</a:t>
             </a:r>
             <a:endParaRPr sz="2400"/>
           </a:p>
@@ -8341,7 +8802,7 @@
             </a:pPr>
             <a:r>
               <a:rPr lang="pt-BR" sz="2400"/>
-              <a:t>Prepara todo o ambiente para o kernel (base de dados, filesystem, etc)</a:t>
+              <a:t>Prepara todo o ambiente para o kernel (base de dados, filesystem, etc);</a:t>
             </a:r>
             <a:endParaRPr sz="2400"/>
           </a:p>
@@ -8358,7 +8819,7 @@
             </a:pPr>
             <a:r>
               <a:rPr lang="pt-BR" sz="2400"/>
-              <a:t>Executa o procedimento de inicialização kernel</a:t>
+              <a:t>Executa o procedimento de inicialização kernel;</a:t>
             </a:r>
             <a:endParaRPr sz="2400"/>
           </a:p>
@@ -8375,7 +8836,7 @@
             </a:pPr>
             <a:r>
               <a:rPr lang="pt-BR" sz="2400"/>
-              <a:t>Entrega o controle do computador para o kernel</a:t>
+              <a:t>Entrega o controle do computador para o kernel.</a:t>
             </a:r>
             <a:endParaRPr sz="2400"/>
           </a:p>

</xml_diff>